<commit_message>
Second revision of project proposal
</commit_message>
<xml_diff>
--- a/docs/presentation-proposal/group02-proposalPresentation-warehouse.pptx
+++ b/docs/presentation-proposal/group02-proposalPresentation-warehouse.pptx
@@ -5,19 +5,20 @@
     <p:sldMasterId id="2147483660" r:id="rId1"/>
   </p:sldMasterIdLst>
   <p:notesMasterIdLst>
-    <p:notesMasterId r:id="rId12"/>
+    <p:notesMasterId r:id="rId13"/>
   </p:notesMasterIdLst>
   <p:sldIdLst>
     <p:sldId id="256" r:id="rId2"/>
     <p:sldId id="260" r:id="rId3"/>
     <p:sldId id="266" r:id="rId4"/>
-    <p:sldId id="259" r:id="rId5"/>
-    <p:sldId id="261" r:id="rId6"/>
-    <p:sldId id="263" r:id="rId7"/>
-    <p:sldId id="264" r:id="rId8"/>
-    <p:sldId id="265" r:id="rId9"/>
-    <p:sldId id="257" r:id="rId10"/>
-    <p:sldId id="258" r:id="rId11"/>
+    <p:sldId id="267" r:id="rId5"/>
+    <p:sldId id="259" r:id="rId6"/>
+    <p:sldId id="261" r:id="rId7"/>
+    <p:sldId id="263" r:id="rId8"/>
+    <p:sldId id="264" r:id="rId9"/>
+    <p:sldId id="265" r:id="rId10"/>
+    <p:sldId id="257" r:id="rId11"/>
+    <p:sldId id="258" r:id="rId12"/>
   </p:sldIdLst>
   <p:sldSz cx="9144000" cy="6858000" type="screen4x3"/>
   <p:notesSz cx="6858000" cy="9144000"/>
@@ -533,7 +534,7 @@
           <a:p>
             <a:fld id="{CC6A8E79-C43C-4BE9-815B-BB8A78C8DF5A}" type="slidenum">
               <a:rPr lang="en-US" smtClean="0"/>
-              <a:t>4</a:t>
+              <a:t>5</a:t>
             </a:fld>
             <a:endParaRPr lang="en-US"/>
           </a:p>
@@ -4312,6 +4313,174 @@
           <a:bodyPr/>
           <a:lstStyle/>
           <a:p>
+            <a:r>
+              <a:rPr lang="en-US" dirty="0" smtClean="0"/>
+              <a:t>Project Tools</a:t>
+            </a:r>
+            <a:endParaRPr lang="en-US" dirty="0"/>
+          </a:p>
+        </p:txBody>
+      </p:sp>
+      <p:sp>
+        <p:nvSpPr>
+          <p:cNvPr id="3" name="Content Placeholder 2"/>
+          <p:cNvSpPr>
+            <a:spLocks noGrp="1"/>
+          </p:cNvSpPr>
+          <p:nvPr>
+            <p:ph sz="quarter" idx="1"/>
+          </p:nvPr>
+        </p:nvSpPr>
+        <p:spPr/>
+        <p:txBody>
+          <a:bodyPr>
+            <a:normAutofit/>
+          </a:bodyPr>
+          <a:lstStyle/>
+          <a:p>
+            <a:r>
+              <a:rPr lang="en-US" sz="3200" dirty="0" smtClean="0"/>
+              <a:t>Software</a:t>
+            </a:r>
+          </a:p>
+          <a:p>
+            <a:pPr lvl="1"/>
+            <a:r>
+              <a:rPr lang="en-US" sz="3200" dirty="0" smtClean="0"/>
+              <a:t>Languages</a:t>
+            </a:r>
+          </a:p>
+          <a:p>
+            <a:pPr lvl="2"/>
+            <a:r>
+              <a:rPr lang="en-US" sz="3200" dirty="0" smtClean="0"/>
+              <a:t>Java</a:t>
+            </a:r>
+          </a:p>
+          <a:p>
+            <a:pPr lvl="2"/>
+            <a:r>
+              <a:rPr lang="en-US" sz="3200" dirty="0" smtClean="0"/>
+              <a:t>SQL</a:t>
+            </a:r>
+          </a:p>
+          <a:p>
+            <a:pPr lvl="2"/>
+            <a:endParaRPr lang="en-US" sz="3200" dirty="0" smtClean="0"/>
+          </a:p>
+          <a:p>
+            <a:pPr lvl="1"/>
+            <a:r>
+              <a:rPr lang="en-US" sz="3200" dirty="0" smtClean="0"/>
+              <a:t>Databases</a:t>
+            </a:r>
+          </a:p>
+          <a:p>
+            <a:pPr lvl="2"/>
+            <a:r>
+              <a:rPr lang="en-US" sz="3200" dirty="0" err="1" smtClean="0"/>
+              <a:t>MySQL</a:t>
+            </a:r>
+            <a:endParaRPr lang="en-US" sz="3200" dirty="0" smtClean="0"/>
+          </a:p>
+          <a:p>
+            <a:pPr lvl="2"/>
+            <a:r>
+              <a:rPr lang="en-US" sz="3200" dirty="0" smtClean="0"/>
+              <a:t>Neo4j</a:t>
+            </a:r>
+          </a:p>
+        </p:txBody>
+      </p:sp>
+      <p:sp>
+        <p:nvSpPr>
+          <p:cNvPr id="4" name="Content Placeholder 3"/>
+          <p:cNvSpPr>
+            <a:spLocks noGrp="1"/>
+          </p:cNvSpPr>
+          <p:nvPr>
+            <p:ph sz="quarter" idx="2"/>
+          </p:nvPr>
+        </p:nvSpPr>
+        <p:spPr/>
+        <p:txBody>
+          <a:bodyPr/>
+          <a:lstStyle/>
+          <a:p>
+            <a:r>
+              <a:rPr lang="en-US" sz="3200" dirty="0" smtClean="0"/>
+              <a:t>Project Management</a:t>
+            </a:r>
+          </a:p>
+          <a:p>
+            <a:pPr lvl="2"/>
+            <a:r>
+              <a:rPr lang="en-US" sz="3200" dirty="0" err="1" smtClean="0"/>
+              <a:t>GitHub</a:t>
+            </a:r>
+            <a:endParaRPr lang="en-US" sz="3200" dirty="0" smtClean="0"/>
+          </a:p>
+          <a:p>
+            <a:pPr lvl="2"/>
+            <a:r>
+              <a:rPr lang="en-US" sz="3200" dirty="0" smtClean="0"/>
+              <a:t>Ant</a:t>
+            </a:r>
+          </a:p>
+          <a:p>
+            <a:pPr lvl="2"/>
+            <a:r>
+              <a:rPr lang="en-US" sz="3200" dirty="0" err="1" smtClean="0"/>
+              <a:t>Doxygen</a:t>
+            </a:r>
+            <a:endParaRPr lang="en-US" sz="3200" dirty="0" smtClean="0"/>
+          </a:p>
+          <a:p>
+            <a:pPr lvl="1"/>
+            <a:endParaRPr lang="en-US" dirty="0"/>
+          </a:p>
+        </p:txBody>
+      </p:sp>
+    </p:spTree>
+  </p:cSld>
+  <p:clrMapOvr>
+    <a:masterClrMapping/>
+  </p:clrMapOvr>
+</p:sld>
+</file>
+
+<file path=ppt/slides/slide11.xml><?xml version="1.0" encoding="utf-8"?>
+<p:sld xmlns:a="http://schemas.openxmlformats.org/drawingml/2006/main" xmlns:r="http://schemas.openxmlformats.org/officeDocument/2006/relationships" xmlns:p="http://schemas.openxmlformats.org/presentationml/2006/main">
+  <p:cSld>
+    <p:spTree>
+      <p:nvGrpSpPr>
+        <p:cNvPr id="1" name=""/>
+        <p:cNvGrpSpPr/>
+        <p:nvPr/>
+      </p:nvGrpSpPr>
+      <p:grpSpPr>
+        <a:xfrm>
+          <a:off x="0" y="0"/>
+          <a:ext cx="0" cy="0"/>
+          <a:chOff x="0" y="0"/>
+          <a:chExt cx="0" cy="0"/>
+        </a:xfrm>
+      </p:grpSpPr>
+      <p:sp>
+        <p:nvSpPr>
+          <p:cNvPr id="2" name="Title 1"/>
+          <p:cNvSpPr>
+            <a:spLocks noGrp="1"/>
+          </p:cNvSpPr>
+          <p:nvPr>
+            <p:ph type="title"/>
+          </p:nvPr>
+        </p:nvSpPr>
+        <p:spPr/>
+        <p:txBody>
+          <a:bodyPr/>
+          <a:lstStyle/>
+          <a:p>
             <a:endParaRPr lang="en-US"/>
           </a:p>
         </p:txBody>
@@ -4519,10 +4688,79 @@
         </p:nvSpPr>
         <p:spPr/>
         <p:txBody>
-          <a:bodyPr/>
-          <a:lstStyle/>
-          <a:p>
-            <a:endParaRPr lang="en-US" dirty="0"/>
+          <a:bodyPr>
+            <a:normAutofit lnSpcReduction="10000"/>
+          </a:bodyPr>
+          <a:lstStyle/>
+          <a:p>
+            <a:r>
+              <a:rPr lang="en-US" dirty="0" smtClean="0"/>
+              <a:t>Standalone warehouse</a:t>
+            </a:r>
+          </a:p>
+          <a:p>
+            <a:r>
+              <a:rPr lang="en-US" dirty="0" smtClean="0"/>
+              <a:t>Purchases goods</a:t>
+            </a:r>
+          </a:p>
+          <a:p>
+            <a:r>
+              <a:rPr lang="en-US" dirty="0" smtClean="0"/>
+              <a:t>Ships goods ordered by customers</a:t>
+            </a:r>
+          </a:p>
+          <a:p>
+            <a:r>
+              <a:rPr lang="en-US" dirty="0" smtClean="0"/>
+              <a:t>Stock Handlers</a:t>
+            </a:r>
+          </a:p>
+          <a:p>
+            <a:pPr lvl="1"/>
+            <a:r>
+              <a:rPr lang="en-US" dirty="0" smtClean="0"/>
+              <a:t>Gather and put away goods</a:t>
+            </a:r>
+          </a:p>
+          <a:p>
+            <a:r>
+              <a:rPr lang="en-US" dirty="0" smtClean="0"/>
+              <a:t>Receivers</a:t>
+            </a:r>
+          </a:p>
+          <a:p>
+            <a:pPr lvl="1"/>
+            <a:r>
+              <a:rPr lang="en-US" dirty="0" smtClean="0"/>
+              <a:t>Process incoming shipments</a:t>
+            </a:r>
+          </a:p>
+          <a:p>
+            <a:r>
+              <a:rPr lang="en-US" dirty="0" smtClean="0"/>
+              <a:t>Shippers</a:t>
+            </a:r>
+          </a:p>
+          <a:p>
+            <a:pPr lvl="1"/>
+            <a:r>
+              <a:rPr lang="en-US" dirty="0" smtClean="0"/>
+              <a:t>Arrange outgoing shipments</a:t>
+            </a:r>
+          </a:p>
+          <a:p>
+            <a:r>
+              <a:rPr lang="en-US" dirty="0" smtClean="0"/>
+              <a:t>Management</a:t>
+            </a:r>
+          </a:p>
+          <a:p>
+            <a:pPr lvl="1"/>
+            <a:r>
+              <a:rPr lang="en-US" dirty="0" smtClean="0"/>
+              <a:t>Over see planning and organization of the warehouse</a:t>
+            </a:r>
           </a:p>
         </p:txBody>
       </p:sp>
@@ -4566,56 +4804,46 @@
           <a:bodyPr/>
           <a:lstStyle/>
           <a:p>
+            <a:endParaRPr lang="en-US"/>
+          </a:p>
+        </p:txBody>
+      </p:sp>
+      <p:sp>
+        <p:nvSpPr>
+          <p:cNvPr id="3" name="Content Placeholder 2"/>
+          <p:cNvSpPr>
+            <a:spLocks noGrp="1"/>
+          </p:cNvSpPr>
+          <p:nvPr>
+            <p:ph sz="quarter" idx="1"/>
+          </p:nvPr>
+        </p:nvSpPr>
+        <p:spPr/>
+        <p:txBody>
+          <a:bodyPr/>
+          <a:lstStyle/>
+          <a:p>
             <a:r>
               <a:rPr lang="en-US" dirty="0" smtClean="0"/>
-              <a:t>Progress</a:t>
-            </a:r>
+              <a:t>Revolves around a GUI</a:t>
+            </a:r>
+          </a:p>
+          <a:p>
+            <a:r>
+              <a:rPr lang="en-US" dirty="0" smtClean="0"/>
+              <a:t>Interactive map of the </a:t>
+            </a:r>
+            <a:r>
+              <a:rPr lang="en-US" dirty="0" err="1" smtClean="0"/>
+              <a:t>floorplan</a:t>
+            </a:r>
+            <a:r>
+              <a:rPr lang="en-US" dirty="0" smtClean="0"/>
+              <a:t> of the warehouse</a:t>
+            </a:r>
+          </a:p>
+          <a:p>
             <a:endParaRPr lang="en-US" dirty="0"/>
-          </a:p>
-        </p:txBody>
-      </p:sp>
-      <p:sp>
-        <p:nvSpPr>
-          <p:cNvPr id="3" name="Content Placeholder 2"/>
-          <p:cNvSpPr>
-            <a:spLocks noGrp="1"/>
-          </p:cNvSpPr>
-          <p:nvPr>
-            <p:ph sz="quarter" idx="1"/>
-          </p:nvPr>
-        </p:nvSpPr>
-        <p:spPr/>
-        <p:txBody>
-          <a:bodyPr>
-            <a:normAutofit/>
-          </a:bodyPr>
-          <a:lstStyle/>
-          <a:p>
-            <a:r>
-              <a:rPr lang="en-US" sz="3600" dirty="0" smtClean="0"/>
-              <a:t>Prototype Design</a:t>
-            </a:r>
-          </a:p>
-          <a:p>
-            <a:r>
-              <a:rPr lang="en-US" sz="3600" dirty="0" smtClean="0"/>
-              <a:t>Documentation</a:t>
-            </a:r>
-          </a:p>
-          <a:p>
-            <a:r>
-              <a:rPr lang="en-US" sz="3600" dirty="0" smtClean="0"/>
-              <a:t>Database Design and Setup</a:t>
-            </a:r>
-          </a:p>
-          <a:p>
-            <a:r>
-              <a:rPr lang="en-US" sz="3600" dirty="0" smtClean="0"/>
-              <a:t>Preliminary GUI Implementation </a:t>
-            </a:r>
-          </a:p>
-          <a:p>
-            <a:endParaRPr lang="en-US" sz="3600" dirty="0"/>
           </a:p>
         </p:txBody>
       </p:sp>
@@ -4660,8 +4888,8 @@
           <a:lstStyle/>
           <a:p>
             <a:r>
-              <a:rPr lang="en-US" altLang="zh-CN" b="1" dirty="0" smtClean="0"/>
-              <a:t>Stock Handler</a:t>
+              <a:rPr lang="en-US" dirty="0" smtClean="0"/>
+              <a:t>Progress</a:t>
             </a:r>
             <a:endParaRPr lang="en-US" dirty="0"/>
           </a:p>
@@ -4679,51 +4907,36 @@
         </p:nvSpPr>
         <p:spPr/>
         <p:txBody>
-          <a:bodyPr/>
-          <a:lstStyle/>
-          <a:p>
-            <a:pPr marL="457200" indent="-457200">
-              <a:buFont typeface="Arial" pitchFamily="34" charset="0"/>
-              <a:buChar char="•"/>
-            </a:pPr>
-            <a:r>
-              <a:rPr lang="en-US" altLang="zh-CN" dirty="0" smtClean="0"/>
-              <a:t>Create daily plans for stock to be gather	</a:t>
-            </a:r>
-          </a:p>
-          <a:p>
-            <a:pPr marL="457200" indent="-457200">
-              <a:buFont typeface="Arial" pitchFamily="34" charset="0"/>
-              <a:buChar char="•"/>
-            </a:pPr>
-            <a:r>
-              <a:rPr lang="en-US" altLang="zh-CN" dirty="0" smtClean="0"/>
-              <a:t>Figure out most efficient routes to take to gather all products for shipment 	</a:t>
-            </a:r>
-          </a:p>
-          <a:p>
-            <a:pPr marL="457200" indent="-457200">
-              <a:buFont typeface="Arial" pitchFamily="34" charset="0"/>
-              <a:buChar char="•"/>
-            </a:pPr>
-            <a:r>
-              <a:rPr lang="en-US" altLang="zh-CN" dirty="0" smtClean="0"/>
-              <a:t>Recording and monitoring of inconsistencies in stock levels 	</a:t>
-            </a:r>
-          </a:p>
-          <a:p>
-            <a:pPr marL="457200" indent="-457200">
-              <a:buFont typeface="Arial" pitchFamily="34" charset="0"/>
-              <a:buChar char="•"/>
-            </a:pPr>
-            <a:r>
-              <a:rPr lang="en-US" altLang="zh-CN" dirty="0" smtClean="0"/>
-              <a:t>Track speed of each of the workers</a:t>
-            </a:r>
-            <a:endParaRPr lang="zh-CN" altLang="en-US" dirty="0" smtClean="0"/>
-          </a:p>
-          <a:p>
-            <a:endParaRPr lang="en-US" dirty="0"/>
+          <a:bodyPr>
+            <a:normAutofit/>
+          </a:bodyPr>
+          <a:lstStyle/>
+          <a:p>
+            <a:r>
+              <a:rPr lang="en-US" sz="3600" dirty="0" smtClean="0"/>
+              <a:t>Prototype Design</a:t>
+            </a:r>
+          </a:p>
+          <a:p>
+            <a:r>
+              <a:rPr lang="en-US" sz="3600" dirty="0" smtClean="0"/>
+              <a:t>Documentation</a:t>
+            </a:r>
+          </a:p>
+          <a:p>
+            <a:r>
+              <a:rPr lang="en-US" sz="3600" dirty="0" smtClean="0"/>
+              <a:t>Database Design and Setup</a:t>
+            </a:r>
+          </a:p>
+          <a:p>
+            <a:r>
+              <a:rPr lang="en-US" sz="3600" dirty="0" smtClean="0"/>
+              <a:t>Preliminary GUI Implementation </a:t>
+            </a:r>
+          </a:p>
+          <a:p>
+            <a:endParaRPr lang="en-US" sz="3600" dirty="0"/>
           </a:p>
         </p:txBody>
       </p:sp>
@@ -4754,7 +4967,7 @@
       </p:grpSpPr>
       <p:sp>
         <p:nvSpPr>
-          <p:cNvPr id="2" name="标题 1"/>
+          <p:cNvPr id="2" name="Title 1"/>
           <p:cNvSpPr>
             <a:spLocks noGrp="1"/>
           </p:cNvSpPr>
@@ -4764,109 +4977,30 @@
         </p:nvSpPr>
         <p:spPr/>
         <p:txBody>
-          <a:bodyPr>
-            <a:normAutofit/>
-          </a:bodyPr>
-          <a:lstStyle/>
-          <a:p>
-            <a:r>
-              <a:rPr lang="en-US" altLang="zh-CN" b="1" dirty="0"/>
-              <a:t>Shipper </a:t>
-            </a:r>
+          <a:bodyPr/>
+          <a:lstStyle/>
+          <a:p>
             <a:r>
               <a:rPr lang="en-US" altLang="zh-CN" b="1" dirty="0" smtClean="0"/>
-              <a:t>&amp; </a:t>
-            </a:r>
-            <a:r>
-              <a:rPr lang="en-US" altLang="zh-CN" b="1" dirty="0"/>
-              <a:t>Receiver 	</a:t>
-            </a:r>
-            <a:endParaRPr lang="zh-CN" altLang="en-US" b="1" dirty="0"/>
-          </a:p>
-        </p:txBody>
-      </p:sp>
-      <p:sp>
-        <p:nvSpPr>
-          <p:cNvPr id="3" name="内容占位符 2"/>
-          <p:cNvSpPr>
-            <a:spLocks noGrp="1"/>
-          </p:cNvSpPr>
-          <p:nvPr>
-            <p:ph idx="1"/>
-          </p:nvPr>
-        </p:nvSpPr>
-        <p:spPr>
-          <a:xfrm>
-            <a:off x="910861" y="1556792"/>
-            <a:ext cx="7618040" cy="2088232"/>
-          </a:xfrm>
-        </p:spPr>
-        <p:txBody>
-          <a:bodyPr/>
-          <a:lstStyle/>
-          <a:p>
-            <a:r>
-              <a:rPr lang="en-US" altLang="zh-CN" dirty="0"/>
-              <a:t>Check and </a:t>
-            </a:r>
-            <a:r>
-              <a:rPr lang="en-US" altLang="zh-CN" dirty="0" smtClean="0"/>
-              <a:t>assign </a:t>
-            </a:r>
-            <a:r>
-              <a:rPr lang="en-US" altLang="zh-CN" dirty="0"/>
-              <a:t>upcoming </a:t>
-            </a:r>
-            <a:r>
-              <a:rPr lang="en-US" altLang="zh-CN" dirty="0" smtClean="0"/>
-              <a:t>shipments	</a:t>
-            </a:r>
-          </a:p>
-          <a:p>
-            <a:r>
-              <a:rPr lang="en-US" altLang="zh-CN" dirty="0" smtClean="0"/>
-              <a:t>Record </a:t>
-            </a:r>
-            <a:r>
-              <a:rPr lang="en-US" altLang="zh-CN" dirty="0"/>
-              <a:t>outgoing shipment </a:t>
-            </a:r>
-            <a:r>
-              <a:rPr lang="en-US" altLang="zh-CN" dirty="0" smtClean="0"/>
-              <a:t>information</a:t>
-            </a:r>
-          </a:p>
-          <a:p>
-            <a:r>
-              <a:rPr lang="en-US" altLang="zh-CN" dirty="0"/>
-              <a:t>Track pallet contents </a:t>
-            </a:r>
-          </a:p>
-          <a:p>
-            <a:endParaRPr lang="en-US" altLang="zh-CN" dirty="0"/>
-          </a:p>
-        </p:txBody>
-      </p:sp>
-      <p:sp>
-        <p:nvSpPr>
-          <p:cNvPr id="4" name="TextBox 3"/>
-          <p:cNvSpPr txBox="1"/>
-          <p:nvPr/>
-        </p:nvSpPr>
-        <p:spPr>
-          <a:xfrm>
-            <a:off x="907615" y="3501008"/>
-            <a:ext cx="7549571" cy="2062103"/>
-          </a:xfrm>
-          <a:prstGeom prst="rect">
-            <a:avLst/>
-          </a:prstGeom>
-          <a:noFill/>
-        </p:spPr>
-        <p:txBody>
-          <a:bodyPr wrap="square" rtlCol="0">
-            <a:spAutoFit/>
-          </a:bodyPr>
+              <a:t>Stock Handler</a:t>
+            </a:r>
+            <a:endParaRPr lang="en-US" dirty="0"/>
+          </a:p>
+        </p:txBody>
+      </p:sp>
+      <p:sp>
+        <p:nvSpPr>
+          <p:cNvPr id="3" name="Content Placeholder 2"/>
+          <p:cNvSpPr>
+            <a:spLocks noGrp="1"/>
+          </p:cNvSpPr>
+          <p:nvPr>
+            <p:ph sz="quarter" idx="1"/>
+          </p:nvPr>
+        </p:nvSpPr>
+        <p:spPr/>
+        <p:txBody>
+          <a:bodyPr/>
           <a:lstStyle/>
           <a:p>
             <a:pPr marL="457200" indent="-457200">
@@ -4874,10 +5008,9 @@
               <a:buChar char="•"/>
             </a:pPr>
             <a:r>
-              <a:rPr lang="en-US" altLang="zh-CN" sz="3200" dirty="0"/>
-              <a:t>Input information for incoming products </a:t>
-            </a:r>
-            <a:endParaRPr lang="en-US" altLang="zh-CN" sz="3200" dirty="0" smtClean="0"/>
+              <a:rPr lang="en-US" altLang="zh-CN" dirty="0" smtClean="0"/>
+              <a:t>Create daily plans for stock to be gather	</a:t>
+            </a:r>
           </a:p>
           <a:p>
             <a:pPr marL="457200" indent="-457200">
@@ -4885,12 +5018,8 @@
               <a:buChar char="•"/>
             </a:pPr>
             <a:r>
-              <a:rPr lang="en-US" altLang="zh-CN" sz="3200" dirty="0" smtClean="0"/>
-              <a:t>Check </a:t>
-            </a:r>
-            <a:r>
-              <a:rPr lang="en-US" altLang="zh-CN" sz="3200" dirty="0"/>
-              <a:t>warehouse capacity 	</a:t>
+              <a:rPr lang="en-US" altLang="zh-CN" dirty="0" smtClean="0"/>
+              <a:t>Figure out most efficient routes to take to gather all products for shipment 	</a:t>
             </a:r>
           </a:p>
           <a:p>
@@ -4899,22 +5028,27 @@
               <a:buChar char="•"/>
             </a:pPr>
             <a:r>
-              <a:rPr lang="en-US" altLang="zh-CN" sz="3200" dirty="0" smtClean="0"/>
-              <a:t>Check </a:t>
-            </a:r>
-            <a:r>
-              <a:rPr lang="en-US" altLang="zh-CN" sz="3200" dirty="0"/>
-              <a:t>shipments to be shipped to create space 	</a:t>
-            </a:r>
+              <a:rPr lang="en-US" altLang="zh-CN" dirty="0" smtClean="0"/>
+              <a:t>Recording and monitoring of inconsistencies in stock levels 	</a:t>
+            </a:r>
+          </a:p>
+          <a:p>
+            <a:pPr marL="457200" indent="-457200">
+              <a:buFont typeface="Arial" pitchFamily="34" charset="0"/>
+              <a:buChar char="•"/>
+            </a:pPr>
+            <a:r>
+              <a:rPr lang="en-US" altLang="zh-CN" dirty="0" smtClean="0"/>
+              <a:t>Track speed of each of the workers</a:t>
+            </a:r>
+            <a:endParaRPr lang="zh-CN" altLang="en-US" dirty="0" smtClean="0"/>
+          </a:p>
+          <a:p>
+            <a:endParaRPr lang="en-US" dirty="0"/>
           </a:p>
         </p:txBody>
       </p:sp>
     </p:spTree>
-    <p:extLst>
-      <p:ext uri="{BB962C8B-B14F-4D97-AF65-F5344CB8AC3E}">
-        <p14:creationId xmlns:p14="http://schemas.microsoft.com/office/powerpoint/2010/main" xmlns="" val="3957772106"/>
-      </p:ext>
-    </p:extLst>
   </p:cSld>
   <p:clrMapOvr>
     <a:masterClrMapping/>
@@ -4951,63 +5085,155 @@
         </p:nvSpPr>
         <p:spPr/>
         <p:txBody>
-          <a:bodyPr/>
-          <a:lstStyle/>
-          <a:p>
-            <a:r>
-              <a:rPr lang="en-US" altLang="zh-CN" dirty="0" smtClean="0"/>
-              <a:t>Manager</a:t>
-            </a:r>
-            <a:endParaRPr lang="zh-CN" altLang="en-US" dirty="0"/>
-          </a:p>
-        </p:txBody>
-      </p:sp>
-      <p:sp>
-        <p:nvSpPr>
-          <p:cNvPr id="3" name="内容占位符 2"/>
-          <p:cNvSpPr>
-            <a:spLocks noGrp="1"/>
-          </p:cNvSpPr>
-          <p:nvPr>
-            <p:ph idx="1"/>
-          </p:nvPr>
-        </p:nvSpPr>
-        <p:spPr>
-          <a:xfrm>
-            <a:off x="971600" y="2132856"/>
-            <a:ext cx="7879162" cy="2764903"/>
-          </a:xfrm>
-        </p:spPr>
-        <p:txBody>
           <a:bodyPr>
             <a:normAutofit/>
           </a:bodyPr>
           <a:lstStyle/>
           <a:p>
             <a:r>
+              <a:rPr lang="en-US" altLang="zh-CN" b="1" dirty="0"/>
+              <a:t>Shipper </a:t>
+            </a:r>
+            <a:r>
+              <a:rPr lang="en-US" altLang="zh-CN" b="1" dirty="0" smtClean="0"/>
+              <a:t>&amp; </a:t>
+            </a:r>
+            <a:r>
+              <a:rPr lang="en-US" altLang="zh-CN" b="1" dirty="0"/>
+              <a:t>Receiver 	</a:t>
+            </a:r>
+            <a:endParaRPr lang="zh-CN" altLang="en-US" b="1" dirty="0"/>
+          </a:p>
+        </p:txBody>
+      </p:sp>
+      <p:sp>
+        <p:nvSpPr>
+          <p:cNvPr id="3" name="内容占位符 2"/>
+          <p:cNvSpPr>
+            <a:spLocks noGrp="1"/>
+          </p:cNvSpPr>
+          <p:nvPr>
+            <p:ph idx="1"/>
+          </p:nvPr>
+        </p:nvSpPr>
+        <p:spPr>
+          <a:xfrm>
+            <a:off x="910861" y="1556792"/>
+            <a:ext cx="7618040" cy="2088232"/>
+          </a:xfrm>
+        </p:spPr>
+        <p:txBody>
+          <a:bodyPr/>
+          <a:lstStyle/>
+          <a:p>
+            <a:r>
+              <a:rPr lang="en-US" altLang="zh-CN" dirty="0"/>
+              <a:t>Check and </a:t>
+            </a:r>
+            <a:r>
               <a:rPr lang="en-US" altLang="zh-CN" dirty="0" smtClean="0"/>
-              <a:t>It is a management and reporting system</a:t>
-            </a:r>
-          </a:p>
-          <a:p>
+              <a:t>assign </a:t>
+            </a:r>
+            <a:r>
+              <a:rPr lang="en-US" altLang="zh-CN" dirty="0"/>
+              <a:t>upcoming </a:t>
+            </a:r>
             <a:r>
               <a:rPr lang="en-US" altLang="zh-CN" dirty="0" smtClean="0"/>
-              <a:t>Product listing, purchase order listing and shipping listing, including basic information about item name, price, and time.</a:t>
+              <a:t>shipments	</a:t>
             </a:r>
           </a:p>
           <a:p>
             <a:r>
               <a:rPr lang="en-US" altLang="zh-CN" dirty="0" smtClean="0"/>
-              <a:t>Statistic report, employee report.</a:t>
-            </a:r>
-            <a:endParaRPr lang="zh-CN" altLang="en-US" dirty="0"/>
+              <a:t>Record </a:t>
+            </a:r>
+            <a:r>
+              <a:rPr lang="en-US" altLang="zh-CN" dirty="0"/>
+              <a:t>outgoing shipment </a:t>
+            </a:r>
+            <a:r>
+              <a:rPr lang="en-US" altLang="zh-CN" dirty="0" smtClean="0"/>
+              <a:t>information</a:t>
+            </a:r>
+          </a:p>
+          <a:p>
+            <a:r>
+              <a:rPr lang="en-US" altLang="zh-CN" dirty="0"/>
+              <a:t>Track pallet contents </a:t>
+            </a:r>
+          </a:p>
+          <a:p>
+            <a:endParaRPr lang="en-US" altLang="zh-CN" dirty="0"/>
+          </a:p>
+        </p:txBody>
+      </p:sp>
+      <p:sp>
+        <p:nvSpPr>
+          <p:cNvPr id="4" name="TextBox 3"/>
+          <p:cNvSpPr txBox="1"/>
+          <p:nvPr/>
+        </p:nvSpPr>
+        <p:spPr>
+          <a:xfrm>
+            <a:off x="907615" y="3501008"/>
+            <a:ext cx="7549571" cy="2062103"/>
+          </a:xfrm>
+          <a:prstGeom prst="rect">
+            <a:avLst/>
+          </a:prstGeom>
+          <a:noFill/>
+        </p:spPr>
+        <p:txBody>
+          <a:bodyPr wrap="square" rtlCol="0">
+            <a:spAutoFit/>
+          </a:bodyPr>
+          <a:lstStyle/>
+          <a:p>
+            <a:pPr marL="457200" indent="-457200">
+              <a:buFont typeface="Arial" pitchFamily="34" charset="0"/>
+              <a:buChar char="•"/>
+            </a:pPr>
+            <a:r>
+              <a:rPr lang="en-US" altLang="zh-CN" sz="3200" dirty="0"/>
+              <a:t>Input information for incoming products </a:t>
+            </a:r>
+            <a:endParaRPr lang="en-US" altLang="zh-CN" sz="3200" dirty="0" smtClean="0"/>
+          </a:p>
+          <a:p>
+            <a:pPr marL="457200" indent="-457200">
+              <a:buFont typeface="Arial" pitchFamily="34" charset="0"/>
+              <a:buChar char="•"/>
+            </a:pPr>
+            <a:r>
+              <a:rPr lang="en-US" altLang="zh-CN" sz="3200" dirty="0" smtClean="0"/>
+              <a:t>Check </a:t>
+            </a:r>
+            <a:r>
+              <a:rPr lang="en-US" altLang="zh-CN" sz="3200" dirty="0"/>
+              <a:t>warehouse capacity 	</a:t>
+            </a:r>
+          </a:p>
+          <a:p>
+            <a:pPr marL="457200" indent="-457200">
+              <a:buFont typeface="Arial" pitchFamily="34" charset="0"/>
+              <a:buChar char="•"/>
+            </a:pPr>
+            <a:r>
+              <a:rPr lang="en-US" altLang="zh-CN" sz="3200" dirty="0" smtClean="0"/>
+              <a:t>Check </a:t>
+            </a:r>
+            <a:r>
+              <a:rPr lang="en-US" altLang="zh-CN" sz="3200" dirty="0"/>
+              <a:t>shipments to be shipped to create space 	</a:t>
+            </a:r>
           </a:p>
         </p:txBody>
       </p:sp>
     </p:spTree>
     <p:extLst>
       <p:ext uri="{BB962C8B-B14F-4D97-AF65-F5344CB8AC3E}">
-        <p14:creationId xmlns:p14="http://schemas.microsoft.com/office/powerpoint/2010/main" xmlns="" val="1471122107"/>
+        <p14:creationId xmlns:p14="http://schemas.microsoft.com/office/powerpoint/2010/main" xmlns="" val="3957772106"/>
       </p:ext>
     </p:extLst>
   </p:cSld>
@@ -5036,6 +5262,29 @@
       </p:grpSpPr>
       <p:sp>
         <p:nvSpPr>
+          <p:cNvPr id="2" name="标题 1"/>
+          <p:cNvSpPr>
+            <a:spLocks noGrp="1"/>
+          </p:cNvSpPr>
+          <p:nvPr>
+            <p:ph type="title"/>
+          </p:nvPr>
+        </p:nvSpPr>
+        <p:spPr/>
+        <p:txBody>
+          <a:bodyPr/>
+          <a:lstStyle/>
+          <a:p>
+            <a:r>
+              <a:rPr lang="en-US" altLang="zh-CN" dirty="0" smtClean="0"/>
+              <a:t>Manager</a:t>
+            </a:r>
+            <a:endParaRPr lang="zh-CN" altLang="en-US" dirty="0"/>
+          </a:p>
+        </p:txBody>
+      </p:sp>
+      <p:sp>
+        <p:nvSpPr>
           <p:cNvPr id="3" name="内容占位符 2"/>
           <p:cNvSpPr>
             <a:spLocks noGrp="1"/>
@@ -5046,34 +5295,31 @@
         </p:nvSpPr>
         <p:spPr>
           <a:xfrm>
-            <a:off x="1331640" y="2060848"/>
-            <a:ext cx="6419056" cy="2692896"/>
-          </a:xfrm>
-        </p:spPr>
-        <p:txBody>
-          <a:bodyPr/>
+            <a:off x="971600" y="2132856"/>
+            <a:ext cx="7879162" cy="2764903"/>
+          </a:xfrm>
+        </p:spPr>
+        <p:txBody>
+          <a:bodyPr>
+            <a:normAutofit/>
+          </a:bodyPr>
           <a:lstStyle/>
           <a:p>
             <a:r>
               <a:rPr lang="en-US" altLang="zh-CN" dirty="0" smtClean="0"/>
-              <a:t>No</a:t>
-            </a:r>
-            <a:r>
-              <a:rPr lang="en-US" altLang="zh-CN" dirty="0"/>
-              <a:t> breakdown of the work</a:t>
-            </a:r>
-            <a:endParaRPr lang="en-US" altLang="zh-CN" dirty="0" smtClean="0"/>
+              <a:t>It is a management and reporting system</a:t>
+            </a:r>
           </a:p>
           <a:p>
             <a:r>
               <a:rPr lang="en-US" altLang="zh-CN" dirty="0" smtClean="0"/>
-              <a:t>Cooperate closely</a:t>
+              <a:t>Product listing, purchase order listing and shipping listing, including basic information about item name, price, and time.</a:t>
             </a:r>
           </a:p>
           <a:p>
             <a:r>
               <a:rPr lang="en-US" altLang="zh-CN" dirty="0" smtClean="0"/>
-              <a:t>Discuss and Find out solution</a:t>
+              <a:t>Statistic report, employee report.</a:t>
             </a:r>
             <a:endParaRPr lang="zh-CN" altLang="en-US" dirty="0"/>
           </a:p>
@@ -5082,7 +5328,7 @@
     </p:spTree>
     <p:extLst>
       <p:ext uri="{BB962C8B-B14F-4D97-AF65-F5344CB8AC3E}">
-        <p14:creationId xmlns:p14="http://schemas.microsoft.com/office/powerpoint/2010/main" xmlns="" val="1440489434"/>
+        <p14:creationId xmlns:p14="http://schemas.microsoft.com/office/powerpoint/2010/main" xmlns="" val="1471122107"/>
       </p:ext>
     </p:extLst>
   </p:cSld>
@@ -5111,148 +5357,55 @@
       </p:grpSpPr>
       <p:sp>
         <p:nvSpPr>
-          <p:cNvPr id="2" name="Title 1"/>
-          <p:cNvSpPr>
-            <a:spLocks noGrp="1"/>
-          </p:cNvSpPr>
-          <p:nvPr>
-            <p:ph type="title"/>
-          </p:nvPr>
-        </p:nvSpPr>
-        <p:spPr/>
-        <p:txBody>
-          <a:bodyPr/>
-          <a:lstStyle/>
-          <a:p>
-            <a:r>
-              <a:rPr lang="en-US" dirty="0" smtClean="0"/>
-              <a:t>Project Tools</a:t>
-            </a:r>
-            <a:endParaRPr lang="en-US" dirty="0"/>
-          </a:p>
-        </p:txBody>
-      </p:sp>
-      <p:sp>
-        <p:nvSpPr>
-          <p:cNvPr id="3" name="Content Placeholder 2"/>
-          <p:cNvSpPr>
-            <a:spLocks noGrp="1"/>
-          </p:cNvSpPr>
-          <p:nvPr>
-            <p:ph sz="quarter" idx="1"/>
-          </p:nvPr>
-        </p:nvSpPr>
-        <p:spPr/>
-        <p:txBody>
-          <a:bodyPr>
-            <a:normAutofit/>
-          </a:bodyPr>
-          <a:lstStyle/>
-          <a:p>
-            <a:r>
-              <a:rPr lang="en-US" sz="3200" dirty="0" smtClean="0"/>
-              <a:t>Software</a:t>
-            </a:r>
-          </a:p>
-          <a:p>
-            <a:pPr lvl="1"/>
-            <a:r>
-              <a:rPr lang="en-US" sz="3200" dirty="0" smtClean="0"/>
-              <a:t>Languages</a:t>
-            </a:r>
-          </a:p>
-          <a:p>
-            <a:pPr lvl="2"/>
-            <a:r>
-              <a:rPr lang="en-US" sz="3200" dirty="0" smtClean="0"/>
-              <a:t>Java</a:t>
-            </a:r>
-          </a:p>
-          <a:p>
-            <a:pPr lvl="2"/>
-            <a:r>
-              <a:rPr lang="en-US" sz="3200" dirty="0" smtClean="0"/>
-              <a:t>SQL</a:t>
-            </a:r>
-          </a:p>
-          <a:p>
-            <a:pPr lvl="2"/>
-            <a:endParaRPr lang="en-US" sz="3200" dirty="0" smtClean="0"/>
-          </a:p>
-          <a:p>
-            <a:pPr lvl="1"/>
-            <a:r>
-              <a:rPr lang="en-US" sz="3200" dirty="0" smtClean="0"/>
-              <a:t>Databases</a:t>
-            </a:r>
-          </a:p>
-          <a:p>
-            <a:pPr lvl="2"/>
-            <a:r>
-              <a:rPr lang="en-US" sz="3200" dirty="0" err="1" smtClean="0"/>
-              <a:t>MySQL</a:t>
-            </a:r>
-            <a:endParaRPr lang="en-US" sz="3200" dirty="0" smtClean="0"/>
-          </a:p>
-          <a:p>
-            <a:pPr lvl="2"/>
-            <a:r>
-              <a:rPr lang="en-US" sz="3200" dirty="0" smtClean="0"/>
-              <a:t>Neo4j</a:t>
-            </a:r>
-          </a:p>
-        </p:txBody>
-      </p:sp>
-      <p:sp>
-        <p:nvSpPr>
-          <p:cNvPr id="4" name="Content Placeholder 3"/>
-          <p:cNvSpPr>
-            <a:spLocks noGrp="1"/>
-          </p:cNvSpPr>
-          <p:nvPr>
-            <p:ph sz="quarter" idx="2"/>
-          </p:nvPr>
-        </p:nvSpPr>
-        <p:spPr/>
-        <p:txBody>
-          <a:bodyPr/>
-          <a:lstStyle/>
-          <a:p>
-            <a:r>
-              <a:rPr lang="en-US" sz="3200" dirty="0" smtClean="0"/>
-              <a:t>Project Management</a:t>
-            </a:r>
-          </a:p>
-          <a:p>
-            <a:pPr lvl="2"/>
-            <a:r>
-              <a:rPr lang="en-US" sz="3200" dirty="0" err="1" smtClean="0"/>
-              <a:t>GitHub</a:t>
-            </a:r>
-            <a:endParaRPr lang="en-US" sz="3200" dirty="0" smtClean="0"/>
-          </a:p>
-          <a:p>
-            <a:pPr lvl="2"/>
-            <a:r>
-              <a:rPr lang="en-US" sz="3200" dirty="0" smtClean="0"/>
-              <a:t>Ant</a:t>
-            </a:r>
-          </a:p>
-          <a:p>
-            <a:pPr lvl="2"/>
-            <a:r>
-              <a:rPr lang="en-US" sz="3200" dirty="0" err="1" smtClean="0"/>
-              <a:t>Doxygen</a:t>
-            </a:r>
-            <a:endParaRPr lang="en-US" sz="3200" dirty="0" smtClean="0"/>
-          </a:p>
-          <a:p>
-            <a:pPr lvl="1"/>
-            <a:endParaRPr lang="en-US" dirty="0"/>
+          <p:cNvPr id="3" name="内容占位符 2"/>
+          <p:cNvSpPr>
+            <a:spLocks noGrp="1"/>
+          </p:cNvSpPr>
+          <p:nvPr>
+            <p:ph idx="1"/>
+          </p:nvPr>
+        </p:nvSpPr>
+        <p:spPr>
+          <a:xfrm>
+            <a:off x="1331640" y="2060848"/>
+            <a:ext cx="6419056" cy="2692896"/>
+          </a:xfrm>
+        </p:spPr>
+        <p:txBody>
+          <a:bodyPr/>
+          <a:lstStyle/>
+          <a:p>
+            <a:r>
+              <a:rPr lang="en-US" altLang="zh-CN" dirty="0" smtClean="0"/>
+              <a:t>No</a:t>
+            </a:r>
+            <a:r>
+              <a:rPr lang="en-US" altLang="zh-CN" dirty="0"/>
+              <a:t> breakdown of the work</a:t>
+            </a:r>
+            <a:endParaRPr lang="en-US" altLang="zh-CN" dirty="0" smtClean="0"/>
+          </a:p>
+          <a:p>
+            <a:r>
+              <a:rPr lang="en-US" altLang="zh-CN" dirty="0" smtClean="0"/>
+              <a:t>Cooperate closely</a:t>
+            </a:r>
+          </a:p>
+          <a:p>
+            <a:r>
+              <a:rPr lang="en-US" altLang="zh-CN" dirty="0" smtClean="0"/>
+              <a:t>Discuss and Find out solution</a:t>
+            </a:r>
+            <a:endParaRPr lang="zh-CN" altLang="en-US" dirty="0"/>
           </a:p>
         </p:txBody>
       </p:sp>
     </p:spTree>
+    <p:extLst>
+      <p:ext uri="{BB962C8B-B14F-4D97-AF65-F5344CB8AC3E}">
+        <p14:creationId xmlns:p14="http://schemas.microsoft.com/office/powerpoint/2010/main" xmlns="" val="1440489434"/>
+      </p:ext>
+    </p:extLst>
   </p:cSld>
   <p:clrMapOvr>
     <a:masterClrMapping/>

</xml_diff>